<commit_message>
change dance to jelly fish
</commit_message>
<xml_diff>
--- a/논문/그림/프레젠테이션1.pptx
+++ b/논문/그림/프레젠테이션1.pptx
@@ -6,6 +6,7 @@
   </p:sldMasterIdLst>
   <p:sldIdLst>
     <p:sldId id="256" r:id="rId2"/>
+    <p:sldId id="257" r:id="rId3"/>
   </p:sldIdLst>
   <p:sldSz cx="12192000" cy="6858000"/>
   <p:notesSz cx="6858000" cy="9144000"/>
@@ -277,7 +278,7 @@
           <a:p>
             <a:fld id="{F39DBC25-C0E5-6D4A-A844-D84C0DBD87A4}" type="datetimeFigureOut">
               <a:rPr kumimoji="1" lang="ko-Kore-GB" altLang="en-US" smtClean="0"/>
-              <a:t>08/08/2023</a:t>
+              <a:t>10/08/2023</a:t>
             </a:fld>
             <a:endParaRPr kumimoji="1" lang="ko-Kore-GB" altLang="en-US"/>
           </a:p>
@@ -477,7 +478,7 @@
           <a:p>
             <a:fld id="{F39DBC25-C0E5-6D4A-A844-D84C0DBD87A4}" type="datetimeFigureOut">
               <a:rPr kumimoji="1" lang="ko-Kore-GB" altLang="en-US" smtClean="0"/>
-              <a:t>08/08/2023</a:t>
+              <a:t>10/08/2023</a:t>
             </a:fld>
             <a:endParaRPr kumimoji="1" lang="ko-Kore-GB" altLang="en-US"/>
           </a:p>
@@ -687,7 +688,7 @@
           <a:p>
             <a:fld id="{F39DBC25-C0E5-6D4A-A844-D84C0DBD87A4}" type="datetimeFigureOut">
               <a:rPr kumimoji="1" lang="ko-Kore-GB" altLang="en-US" smtClean="0"/>
-              <a:t>08/08/2023</a:t>
+              <a:t>10/08/2023</a:t>
             </a:fld>
             <a:endParaRPr kumimoji="1" lang="ko-Kore-GB" altLang="en-US"/>
           </a:p>
@@ -887,7 +888,7 @@
           <a:p>
             <a:fld id="{F39DBC25-C0E5-6D4A-A844-D84C0DBD87A4}" type="datetimeFigureOut">
               <a:rPr kumimoji="1" lang="ko-Kore-GB" altLang="en-US" smtClean="0"/>
-              <a:t>08/08/2023</a:t>
+              <a:t>10/08/2023</a:t>
             </a:fld>
             <a:endParaRPr kumimoji="1" lang="ko-Kore-GB" altLang="en-US"/>
           </a:p>
@@ -1163,7 +1164,7 @@
           <a:p>
             <a:fld id="{F39DBC25-C0E5-6D4A-A844-D84C0DBD87A4}" type="datetimeFigureOut">
               <a:rPr kumimoji="1" lang="ko-Kore-GB" altLang="en-US" smtClean="0"/>
-              <a:t>08/08/2023</a:t>
+              <a:t>10/08/2023</a:t>
             </a:fld>
             <a:endParaRPr kumimoji="1" lang="ko-Kore-GB" altLang="en-US"/>
           </a:p>
@@ -1431,7 +1432,7 @@
           <a:p>
             <a:fld id="{F39DBC25-C0E5-6D4A-A844-D84C0DBD87A4}" type="datetimeFigureOut">
               <a:rPr kumimoji="1" lang="ko-Kore-GB" altLang="en-US" smtClean="0"/>
-              <a:t>08/08/2023</a:t>
+              <a:t>10/08/2023</a:t>
             </a:fld>
             <a:endParaRPr kumimoji="1" lang="ko-Kore-GB" altLang="en-US"/>
           </a:p>
@@ -1846,7 +1847,7 @@
           <a:p>
             <a:fld id="{F39DBC25-C0E5-6D4A-A844-D84C0DBD87A4}" type="datetimeFigureOut">
               <a:rPr kumimoji="1" lang="ko-Kore-GB" altLang="en-US" smtClean="0"/>
-              <a:t>08/08/2023</a:t>
+              <a:t>10/08/2023</a:t>
             </a:fld>
             <a:endParaRPr kumimoji="1" lang="ko-Kore-GB" altLang="en-US"/>
           </a:p>
@@ -1988,7 +1989,7 @@
           <a:p>
             <a:fld id="{F39DBC25-C0E5-6D4A-A844-D84C0DBD87A4}" type="datetimeFigureOut">
               <a:rPr kumimoji="1" lang="ko-Kore-GB" altLang="en-US" smtClean="0"/>
-              <a:t>08/08/2023</a:t>
+              <a:t>10/08/2023</a:t>
             </a:fld>
             <a:endParaRPr kumimoji="1" lang="ko-Kore-GB" altLang="en-US"/>
           </a:p>
@@ -2101,7 +2102,7 @@
           <a:p>
             <a:fld id="{F39DBC25-C0E5-6D4A-A844-D84C0DBD87A4}" type="datetimeFigureOut">
               <a:rPr kumimoji="1" lang="ko-Kore-GB" altLang="en-US" smtClean="0"/>
-              <a:t>08/08/2023</a:t>
+              <a:t>10/08/2023</a:t>
             </a:fld>
             <a:endParaRPr kumimoji="1" lang="ko-Kore-GB" altLang="en-US"/>
           </a:p>
@@ -2414,7 +2415,7 @@
           <a:p>
             <a:fld id="{F39DBC25-C0E5-6D4A-A844-D84C0DBD87A4}" type="datetimeFigureOut">
               <a:rPr kumimoji="1" lang="ko-Kore-GB" altLang="en-US" smtClean="0"/>
-              <a:t>08/08/2023</a:t>
+              <a:t>10/08/2023</a:t>
             </a:fld>
             <a:endParaRPr kumimoji="1" lang="ko-Kore-GB" altLang="en-US"/>
           </a:p>
@@ -2703,7 +2704,7 @@
           <a:p>
             <a:fld id="{F39DBC25-C0E5-6D4A-A844-D84C0DBD87A4}" type="datetimeFigureOut">
               <a:rPr kumimoji="1" lang="ko-Kore-GB" altLang="en-US" smtClean="0"/>
-              <a:t>08/08/2023</a:t>
+              <a:t>10/08/2023</a:t>
             </a:fld>
             <a:endParaRPr kumimoji="1" lang="ko-Kore-GB" altLang="en-US"/>
           </a:p>
@@ -2946,7 +2947,7 @@
           <a:p>
             <a:fld id="{F39DBC25-C0E5-6D4A-A844-D84C0DBD87A4}" type="datetimeFigureOut">
               <a:rPr kumimoji="1" lang="ko-Kore-GB" altLang="en-US" smtClean="0"/>
-              <a:t>08/08/2023</a:t>
+              <a:t>10/08/2023</a:t>
             </a:fld>
             <a:endParaRPr kumimoji="1" lang="ko-Kore-GB" altLang="en-US"/>
           </a:p>
@@ -4031,7 +4032,7 @@
         <p:spPr>
           <a:xfrm>
             <a:off x="2222692" y="1096072"/>
-            <a:ext cx="780983" cy="246221"/>
+            <a:ext cx="835485" cy="246221"/>
           </a:xfrm>
           <a:prstGeom prst="rect">
             <a:avLst/>
@@ -4046,11 +4047,7 @@
           <a:p>
             <a:r>
               <a:rPr kumimoji="1" lang="en-US" altLang="ko-Kore-GB" sz="1000" dirty="0"/>
-              <a:t>1st </a:t>
-            </a:r>
-            <a:r>
-              <a:rPr kumimoji="1" lang="en-US" altLang="ko-KR" sz="1000" dirty="0"/>
-              <a:t>episode</a:t>
+              <a:t>1st timestep</a:t>
             </a:r>
             <a:endParaRPr kumimoji="1" lang="ko-Kore-GB" altLang="en-US" sz="1000" dirty="0"/>
           </a:p>
@@ -4071,7 +4068,7 @@
         <p:spPr>
           <a:xfrm>
             <a:off x="2222692" y="1637676"/>
-            <a:ext cx="822661" cy="246221"/>
+            <a:ext cx="877163" cy="246221"/>
           </a:xfrm>
           <a:prstGeom prst="rect">
             <a:avLst/>
@@ -4086,11 +4083,7 @@
           <a:p>
             <a:r>
               <a:rPr kumimoji="1" lang="en-US" altLang="ko-Kore-GB" sz="1000" dirty="0"/>
-              <a:t>2nd </a:t>
-            </a:r>
-            <a:r>
-              <a:rPr kumimoji="1" lang="en-US" altLang="ko-KR" sz="1000" dirty="0"/>
-              <a:t>episode</a:t>
+              <a:t>2nd timestep</a:t>
             </a:r>
             <a:endParaRPr kumimoji="1" lang="ko-Kore-GB" altLang="en-US" sz="1000" dirty="0"/>
           </a:p>
@@ -4111,7 +4104,7 @@
         <p:spPr>
           <a:xfrm>
             <a:off x="2222692" y="2166667"/>
-            <a:ext cx="800219" cy="246221"/>
+            <a:ext cx="854721" cy="246221"/>
           </a:xfrm>
           <a:prstGeom prst="rect">
             <a:avLst/>
@@ -4126,11 +4119,7 @@
           <a:p>
             <a:r>
               <a:rPr kumimoji="1" lang="en-US" altLang="ko-Kore-GB" sz="1000" dirty="0"/>
-              <a:t>3rd </a:t>
-            </a:r>
-            <a:r>
-              <a:rPr kumimoji="1" lang="en-US" altLang="ko-KR" sz="1000" dirty="0"/>
-              <a:t>episode</a:t>
+              <a:t>3rd timestep</a:t>
             </a:r>
             <a:endParaRPr kumimoji="1" lang="ko-Kore-GB" altLang="en-US" sz="1000" dirty="0"/>
           </a:p>
@@ -4384,10 +4373,279 @@
           </a:p>
         </p:txBody>
       </p:sp>
+      <p:sp>
+        <p:nvSpPr>
+          <p:cNvPr id="2" name="TextBox 1">
+            <a:extLst>
+              <a:ext uri="{FF2B5EF4-FFF2-40B4-BE49-F238E27FC236}">
+                <a16:creationId xmlns:a16="http://schemas.microsoft.com/office/drawing/2014/main" id="{07A8B9A9-1186-E728-2592-F18F0A858E1F}"/>
+              </a:ext>
+            </a:extLst>
+          </p:cNvPr>
+          <p:cNvSpPr txBox="1"/>
+          <p:nvPr/>
+        </p:nvSpPr>
+        <p:spPr>
+          <a:xfrm>
+            <a:off x="4424397" y="1279404"/>
+            <a:ext cx="453970" cy="184666"/>
+          </a:xfrm>
+          <a:prstGeom prst="rect">
+            <a:avLst/>
+          </a:prstGeom>
+          <a:noFill/>
+        </p:spPr>
+        <p:txBody>
+          <a:bodyPr wrap="none" rtlCol="0">
+            <a:spAutoFit/>
+          </a:bodyPr>
+          <a:lstStyle/>
+          <a:p>
+            <a:r>
+              <a:rPr kumimoji="1" lang="en-US" altLang="ko-Kore-GB" sz="600" dirty="0"/>
+              <a:t>Rewards</a:t>
+            </a:r>
+            <a:endParaRPr kumimoji="1" lang="ko-Kore-GB" altLang="en-US" sz="600" dirty="0"/>
+          </a:p>
+        </p:txBody>
+      </p:sp>
+      <p:sp>
+        <p:nvSpPr>
+          <p:cNvPr id="3" name="TextBox 2">
+            <a:extLst>
+              <a:ext uri="{FF2B5EF4-FFF2-40B4-BE49-F238E27FC236}">
+                <a16:creationId xmlns:a16="http://schemas.microsoft.com/office/drawing/2014/main" id="{0E5C3087-E132-4EDF-FC49-1E4D63B2DBCC}"/>
+              </a:ext>
+            </a:extLst>
+          </p:cNvPr>
+          <p:cNvSpPr txBox="1"/>
+          <p:nvPr/>
+        </p:nvSpPr>
+        <p:spPr>
+          <a:xfrm>
+            <a:off x="5107048" y="1833668"/>
+            <a:ext cx="453970" cy="184666"/>
+          </a:xfrm>
+          <a:prstGeom prst="rect">
+            <a:avLst/>
+          </a:prstGeom>
+          <a:noFill/>
+        </p:spPr>
+        <p:txBody>
+          <a:bodyPr wrap="none" rtlCol="0">
+            <a:spAutoFit/>
+          </a:bodyPr>
+          <a:lstStyle/>
+          <a:p>
+            <a:r>
+              <a:rPr kumimoji="1" lang="en-US" altLang="ko-Kore-GB" sz="600" dirty="0"/>
+              <a:t>Rewards</a:t>
+            </a:r>
+            <a:endParaRPr kumimoji="1" lang="ko-Kore-GB" altLang="en-US" sz="600" dirty="0"/>
+          </a:p>
+        </p:txBody>
+      </p:sp>
+      <p:sp>
+        <p:nvSpPr>
+          <p:cNvPr id="6" name="TextBox 5">
+            <a:extLst>
+              <a:ext uri="{FF2B5EF4-FFF2-40B4-BE49-F238E27FC236}">
+                <a16:creationId xmlns:a16="http://schemas.microsoft.com/office/drawing/2014/main" id="{7CE15586-8900-F57E-7E89-876086E5A824}"/>
+              </a:ext>
+            </a:extLst>
+          </p:cNvPr>
+          <p:cNvSpPr txBox="1"/>
+          <p:nvPr/>
+        </p:nvSpPr>
+        <p:spPr>
+          <a:xfrm>
+            <a:off x="3549917" y="747947"/>
+            <a:ext cx="367408" cy="184666"/>
+          </a:xfrm>
+          <a:prstGeom prst="rect">
+            <a:avLst/>
+          </a:prstGeom>
+          <a:noFill/>
+        </p:spPr>
+        <p:txBody>
+          <a:bodyPr wrap="none" rtlCol="0">
+            <a:spAutoFit/>
+          </a:bodyPr>
+          <a:lstStyle/>
+          <a:p>
+            <a:r>
+              <a:rPr kumimoji="1" lang="en-US" altLang="ko-Kore-GB" sz="600" dirty="0"/>
+              <a:t>Policy</a:t>
+            </a:r>
+            <a:endParaRPr kumimoji="1" lang="ko-Kore-GB" altLang="en-US" sz="600" dirty="0"/>
+          </a:p>
+        </p:txBody>
+      </p:sp>
+      <p:cxnSp>
+        <p:nvCxnSpPr>
+          <p:cNvPr id="11" name="직선 화살표 연결선 10">
+            <a:extLst>
+              <a:ext uri="{FF2B5EF4-FFF2-40B4-BE49-F238E27FC236}">
+                <a16:creationId xmlns:a16="http://schemas.microsoft.com/office/drawing/2014/main" id="{454F3F54-8759-CADE-F05D-E345A4C3C279}"/>
+              </a:ext>
+            </a:extLst>
+          </p:cNvPr>
+          <p:cNvCxnSpPr>
+            <a:cxnSpLocks/>
+            <a:stCxn id="6" idx="2"/>
+          </p:cNvCxnSpPr>
+          <p:nvPr/>
+        </p:nvCxnSpPr>
+        <p:spPr>
+          <a:xfrm>
+            <a:off x="3733621" y="932613"/>
+            <a:ext cx="0" cy="299182"/>
+          </a:xfrm>
+          <a:prstGeom prst="straightConnector1">
+            <a:avLst/>
+          </a:prstGeom>
+          <a:ln>
+            <a:solidFill>
+              <a:schemeClr val="tx1"/>
+            </a:solidFill>
+            <a:headEnd type="none" w="med" len="med"/>
+            <a:tailEnd type="arrow" w="med" len="med"/>
+          </a:ln>
+        </p:spPr>
+        <p:style>
+          <a:lnRef idx="1">
+            <a:schemeClr val="accent1"/>
+          </a:lnRef>
+          <a:fillRef idx="0">
+            <a:schemeClr val="accent1"/>
+          </a:fillRef>
+          <a:effectRef idx="0">
+            <a:schemeClr val="accent1"/>
+          </a:effectRef>
+          <a:fontRef idx="minor">
+            <a:schemeClr val="tx1"/>
+          </a:fontRef>
+        </p:style>
+      </p:cxnSp>
+      <p:sp>
+        <p:nvSpPr>
+          <p:cNvPr id="15" name="오른쪽 중괄호[R] 14">
+            <a:extLst>
+              <a:ext uri="{FF2B5EF4-FFF2-40B4-BE49-F238E27FC236}">
+                <a16:creationId xmlns:a16="http://schemas.microsoft.com/office/drawing/2014/main" id="{1364EB17-171D-2FBB-072A-B4E1B7A10E11}"/>
+              </a:ext>
+            </a:extLst>
+          </p:cNvPr>
+          <p:cNvSpPr/>
+          <p:nvPr/>
+        </p:nvSpPr>
+        <p:spPr>
+          <a:xfrm>
+            <a:off x="5809490" y="845372"/>
+            <a:ext cx="440735" cy="1801911"/>
+          </a:xfrm>
+          <a:prstGeom prst="rightBrace">
+            <a:avLst/>
+          </a:prstGeom>
+          <a:ln w="28575">
+            <a:solidFill>
+              <a:schemeClr val="tx1"/>
+            </a:solidFill>
+          </a:ln>
+        </p:spPr>
+        <p:style>
+          <a:lnRef idx="1">
+            <a:schemeClr val="accent1"/>
+          </a:lnRef>
+          <a:fillRef idx="0">
+            <a:schemeClr val="accent1"/>
+          </a:fillRef>
+          <a:effectRef idx="0">
+            <a:schemeClr val="accent1"/>
+          </a:effectRef>
+          <a:fontRef idx="minor">
+            <a:schemeClr val="tx1"/>
+          </a:fontRef>
+        </p:style>
+        <p:txBody>
+          <a:bodyPr rtlCol="0" anchor="ctr"/>
+          <a:lstStyle/>
+          <a:p>
+            <a:pPr algn="ctr"/>
+            <a:endParaRPr kumimoji="1" lang="ko-Kore-GB" altLang="en-US"/>
+          </a:p>
+        </p:txBody>
+      </p:sp>
+      <p:sp>
+        <p:nvSpPr>
+          <p:cNvPr id="17" name="TextBox 16">
+            <a:extLst>
+              <a:ext uri="{FF2B5EF4-FFF2-40B4-BE49-F238E27FC236}">
+                <a16:creationId xmlns:a16="http://schemas.microsoft.com/office/drawing/2014/main" id="{23E7E872-775B-9452-4A05-441825D42D8D}"/>
+              </a:ext>
+            </a:extLst>
+          </p:cNvPr>
+          <p:cNvSpPr txBox="1"/>
+          <p:nvPr/>
+        </p:nvSpPr>
+        <p:spPr>
+          <a:xfrm>
+            <a:off x="6255757" y="1630911"/>
+            <a:ext cx="553357" cy="230832"/>
+          </a:xfrm>
+          <a:prstGeom prst="rect">
+            <a:avLst/>
+          </a:prstGeom>
+          <a:noFill/>
+        </p:spPr>
+        <p:txBody>
+          <a:bodyPr wrap="none" rtlCol="0">
+            <a:spAutoFit/>
+          </a:bodyPr>
+          <a:lstStyle/>
+          <a:p>
+            <a:r>
+              <a:rPr kumimoji="1" lang="en-US" altLang="ko-Kore-GB" sz="900" dirty="0"/>
+              <a:t>Episode</a:t>
+            </a:r>
+            <a:endParaRPr kumimoji="1" lang="ko-Kore-GB" altLang="en-US" sz="900" dirty="0"/>
+          </a:p>
+        </p:txBody>
+      </p:sp>
     </p:spTree>
     <p:extLst>
       <p:ext uri="{BB962C8B-B14F-4D97-AF65-F5344CB8AC3E}">
         <p14:creationId xmlns:p14="http://schemas.microsoft.com/office/powerpoint/2010/main" val="1111147111"/>
+      </p:ext>
+    </p:extLst>
+  </p:cSld>
+  <p:clrMapOvr>
+    <a:masterClrMapping/>
+  </p:clrMapOvr>
+</p:sld>
+</file>
+
+<file path=ppt/slides/slide2.xml><?xml version="1.0" encoding="utf-8"?>
+<p:sld xmlns:a="http://schemas.openxmlformats.org/drawingml/2006/main" xmlns:r="http://schemas.openxmlformats.org/officeDocument/2006/relationships" xmlns:p="http://schemas.openxmlformats.org/presentationml/2006/main">
+  <p:cSld>
+    <p:spTree>
+      <p:nvGrpSpPr>
+        <p:cNvPr id="1" name=""/>
+        <p:cNvGrpSpPr/>
+        <p:nvPr/>
+      </p:nvGrpSpPr>
+      <p:grpSpPr>
+        <a:xfrm>
+          <a:off x="0" y="0"/>
+          <a:ext cx="0" cy="0"/>
+          <a:chOff x="0" y="0"/>
+          <a:chExt cx="0" cy="0"/>
+        </a:xfrm>
+      </p:grpSpPr>
+    </p:spTree>
+    <p:extLst>
+      <p:ext uri="{BB962C8B-B14F-4D97-AF65-F5344CB8AC3E}">
+        <p14:creationId xmlns:p14="http://schemas.microsoft.com/office/powerpoint/2010/main" val="1015990653"/>
       </p:ext>
     </p:extLst>
   </p:cSld>

</xml_diff>